<commit_message>
fixing CoC link, adding end CTA in slides
</commit_message>
<xml_diff>
--- a/full/build-resume-website/slides.pptx
+++ b/full/build-resume-website/slides.pptx
@@ -226,7 +226,7 @@
           <a:p>
             <a:fld id="{89F46558-97FC-5142-A086-428A49254BB5}" type="datetimeFigureOut">
               <a:rPr lang="en-US" smtClean="0"/>
-              <a:t>1/7/2022</a:t>
+              <a:t>2/17/22</a:t>
             </a:fld>
             <a:endParaRPr lang="en-US"/>
           </a:p>
@@ -4934,7 +4934,7 @@
             <a:fld id="{3F9AFA87-1417-4992-ABD9-27C3BC8CC883}" type="datetimeFigureOut">
               <a:rPr lang="en-US" smtClean="0"/>
               <a:pPr algn="r"/>
-              <a:t>1/7/2022</a:t>
+              <a:t>2/17/22</a:t>
             </a:fld>
             <a:endParaRPr lang="en-US"/>
           </a:p>
@@ -5133,7 +5133,7 @@
           <a:p>
             <a:fld id="{3F9AFA87-1417-4992-ABD9-27C3BC8CC883}" type="datetimeFigureOut">
               <a:rPr lang="en-US" smtClean="0"/>
-              <a:t>1/7/2022</a:t>
+              <a:t>2/17/22</a:t>
             </a:fld>
             <a:endParaRPr lang="en-US"/>
           </a:p>
@@ -5341,7 +5341,7 @@
           <a:p>
             <a:fld id="{3F9AFA87-1417-4992-ABD9-27C3BC8CC883}" type="datetimeFigureOut">
               <a:rPr lang="en-US" smtClean="0"/>
-              <a:t>1/7/2022</a:t>
+              <a:t>2/17/22</a:t>
             </a:fld>
             <a:endParaRPr lang="en-US"/>
           </a:p>
@@ -5539,7 +5539,7 @@
           <a:p>
             <a:fld id="{3F9AFA87-1417-4992-ABD9-27C3BC8CC883}" type="datetimeFigureOut">
               <a:rPr lang="en-US" smtClean="0"/>
-              <a:t>1/7/2022</a:t>
+              <a:t>2/17/22</a:t>
             </a:fld>
             <a:endParaRPr lang="en-US"/>
           </a:p>
@@ -5814,7 +5814,7 @@
           <a:p>
             <a:fld id="{3F9AFA87-1417-4992-ABD9-27C3BC8CC883}" type="datetimeFigureOut">
               <a:rPr lang="en-US" smtClean="0"/>
-              <a:t>1/7/2022</a:t>
+              <a:t>2/17/22</a:t>
             </a:fld>
             <a:endParaRPr lang="en-US"/>
           </a:p>
@@ -6079,7 +6079,7 @@
           <a:p>
             <a:fld id="{3F9AFA87-1417-4992-ABD9-27C3BC8CC883}" type="datetimeFigureOut">
               <a:rPr lang="en-US" smtClean="0"/>
-              <a:t>1/7/2022</a:t>
+              <a:t>2/17/22</a:t>
             </a:fld>
             <a:endParaRPr lang="en-US"/>
           </a:p>
@@ -6491,7 +6491,7 @@
           <a:p>
             <a:fld id="{3F9AFA87-1417-4992-ABD9-27C3BC8CC883}" type="datetimeFigureOut">
               <a:rPr lang="en-US" smtClean="0"/>
-              <a:t>1/7/2022</a:t>
+              <a:t>2/17/22</a:t>
             </a:fld>
             <a:endParaRPr lang="en-US"/>
           </a:p>
@@ -6632,7 +6632,7 @@
           <a:p>
             <a:fld id="{3F9AFA87-1417-4992-ABD9-27C3BC8CC883}" type="datetimeFigureOut">
               <a:rPr lang="en-US" smtClean="0"/>
-              <a:t>1/7/2022</a:t>
+              <a:t>2/17/22</a:t>
             </a:fld>
             <a:endParaRPr lang="en-US"/>
           </a:p>
@@ -6745,7 +6745,7 @@
           <a:p>
             <a:fld id="{3F9AFA87-1417-4992-ABD9-27C3BC8CC883}" type="datetimeFigureOut">
               <a:rPr lang="en-US" smtClean="0"/>
-              <a:t>1/7/2022</a:t>
+              <a:t>2/17/22</a:t>
             </a:fld>
             <a:endParaRPr lang="en-US"/>
           </a:p>
@@ -7056,7 +7056,7 @@
           <a:p>
             <a:fld id="{3F9AFA87-1417-4992-ABD9-27C3BC8CC883}" type="datetimeFigureOut">
               <a:rPr lang="en-US" smtClean="0"/>
-              <a:t>1/7/2022</a:t>
+              <a:t>2/17/22</a:t>
             </a:fld>
             <a:endParaRPr lang="en-US"/>
           </a:p>
@@ -7344,7 +7344,7 @@
           <a:p>
             <a:fld id="{3F9AFA87-1417-4992-ABD9-27C3BC8CC883}" type="datetimeFigureOut">
               <a:rPr lang="en-US" smtClean="0"/>
-              <a:t>1/7/2022</a:t>
+              <a:t>2/17/22</a:t>
             </a:fld>
             <a:endParaRPr lang="en-US"/>
           </a:p>
@@ -7587,7 +7587,7 @@
             <a:fld id="{3F9AFA87-1417-4992-ABD9-27C3BC8CC883}" type="datetimeFigureOut">
               <a:rPr lang="en-US" smtClean="0"/>
               <a:pPr algn="r"/>
-              <a:t>1/7/2022</a:t>
+              <a:t>2/17/22</a:t>
             </a:fld>
             <a:endParaRPr lang="en-US"/>
           </a:p>
@@ -11227,8 +11227,8 @@
         </p:blipFill>
         <p:spPr bwMode="auto">
           <a:xfrm>
-            <a:off x="1474008" y="195469"/>
-            <a:ext cx="9243983" cy="6467061"/>
+            <a:off x="31872" y="18884"/>
+            <a:ext cx="6396830" cy="4475202"/>
           </a:xfrm>
           <a:prstGeom prst="rect">
             <a:avLst/>
@@ -11259,7 +11259,7 @@
         </p:nvSpPr>
         <p:spPr>
           <a:xfrm>
-            <a:off x="3790122" y="1073426"/>
+            <a:off x="1646011" y="576743"/>
             <a:ext cx="3510961" cy="369332"/>
           </a:xfrm>
           <a:prstGeom prst="rect">
@@ -11274,7 +11274,7 @@
           <a:lstStyle/>
           <a:p>
             <a:r>
-              <a:rPr lang="en-US">
+              <a:rPr lang="en-US" dirty="0">
                 <a:effectLst/>
                 <a:latin typeface="Segoe UI Semilight" panose="020B0402040204020203" pitchFamily="34" charset="0"/>
                 <a:cs typeface="Segoe UI Semilight" panose="020B0402040204020203" pitchFamily="34" charset="0"/>
@@ -11282,7 +11282,7 @@
               <a:t>your-</a:t>
             </a:r>
             <a:r>
-              <a:rPr lang="en-US" err="1">
+              <a:rPr lang="en-US" dirty="0" err="1">
                 <a:effectLst/>
                 <a:latin typeface="Segoe UI Semilight" panose="020B0402040204020203" pitchFamily="34" charset="0"/>
                 <a:cs typeface="Segoe UI Semilight" panose="020B0402040204020203" pitchFamily="34" charset="0"/>
@@ -11290,14 +11290,14 @@
               <a:t>username.github.io</a:t>
             </a:r>
             <a:r>
-              <a:rPr lang="en-US">
+              <a:rPr lang="en-US" dirty="0">
                 <a:effectLst/>
                 <a:latin typeface="Segoe UI Semilight" panose="020B0402040204020203" pitchFamily="34" charset="0"/>
                 <a:cs typeface="Segoe UI Semilight" panose="020B0402040204020203" pitchFamily="34" charset="0"/>
               </a:rPr>
               <a:t>/resume/</a:t>
             </a:r>
-            <a:endParaRPr lang="en-US">
+            <a:endParaRPr lang="en-US" dirty="0">
               <a:latin typeface="Segoe UI Semilight" panose="020B0402040204020203" pitchFamily="34" charset="0"/>
               <a:cs typeface="Segoe UI Semilight" panose="020B0402040204020203" pitchFamily="34" charset="0"/>
             </a:endParaRPr>
@@ -11318,8 +11318,8 @@
         </p:nvSpPr>
         <p:spPr>
           <a:xfrm>
-            <a:off x="2849217" y="2027583"/>
-            <a:ext cx="6294415" cy="1200329"/>
+            <a:off x="1139454" y="1503934"/>
+            <a:ext cx="3905512" cy="2031325"/>
           </a:xfrm>
           <a:prstGeom prst="rect">
             <a:avLst/>
@@ -11327,13 +11327,13 @@
           <a:noFill/>
         </p:spPr>
         <p:txBody>
-          <a:bodyPr wrap="none" rtlCol="0">
+          <a:bodyPr wrap="square" rtlCol="0">
             <a:spAutoFit/>
           </a:bodyPr>
           <a:lstStyle/>
           <a:p>
             <a:r>
-              <a:rPr lang="en-US">
+              <a:rPr lang="en-US" dirty="0">
                 <a:latin typeface="Segoe UI Semilight" panose="020B0402040204020203" pitchFamily="34" charset="0"/>
                 <a:cs typeface="Segoe UI Semilight" panose="020B0402040204020203" pitchFamily="34" charset="0"/>
               </a:rPr>
@@ -11341,7 +11341,7 @@
             </a:r>
           </a:p>
           <a:p>
-            <a:endParaRPr lang="en-US">
+            <a:endParaRPr lang="en-US" dirty="0">
               <a:latin typeface="Segoe UI Semilight" panose="020B0402040204020203" pitchFamily="34" charset="0"/>
               <a:cs typeface="Segoe UI Semilight" panose="020B0402040204020203" pitchFamily="34" charset="0"/>
             </a:endParaRPr>
@@ -11352,7 +11352,7 @@
               <a:buChar char="•"/>
             </a:pPr>
             <a:r>
-              <a:rPr lang="en-US">
+              <a:rPr lang="en-US" dirty="0">
                 <a:latin typeface="Segoe UI Semilight" panose="020B0402040204020203" pitchFamily="34" charset="0"/>
                 <a:cs typeface="Segoe UI Semilight" panose="020B0402040204020203" pitchFamily="34" charset="0"/>
               </a:rPr>
@@ -11365,24 +11365,164 @@
               <a:buChar char="•"/>
             </a:pPr>
             <a:r>
-              <a:rPr lang="en-US">
+              <a:rPr lang="en-US" dirty="0">
                 <a:latin typeface="Segoe UI Semilight" panose="020B0402040204020203" pitchFamily="34" charset="0"/>
                 <a:cs typeface="Segoe UI Semilight" panose="020B0402040204020203" pitchFamily="34" charset="0"/>
               </a:rPr>
               <a:t>Explore content on </a:t>
             </a:r>
             <a:r>
-              <a:rPr lang="en-US">
+              <a:rPr lang="en-US" dirty="0">
                 <a:latin typeface="Segoe UI Semilight" panose="020B0402040204020203" pitchFamily="34" charset="0"/>
                 <a:cs typeface="Segoe UI Semilight" panose="020B0402040204020203" pitchFamily="34" charset="0"/>
                 <a:hlinkClick r:id="rId4"/>
               </a:rPr>
               <a:t>Microsoft Learn</a:t>
             </a:r>
-            <a:endParaRPr lang="en-US">
+            <a:endParaRPr lang="en-US" dirty="0">
               <a:latin typeface="Segoe UI Semilight" panose="020B0402040204020203" pitchFamily="34" charset="0"/>
               <a:cs typeface="Segoe UI Semilight" panose="020B0402040204020203" pitchFamily="34" charset="0"/>
             </a:endParaRPr>
+          </a:p>
+        </p:txBody>
+      </p:sp>
+      <p:sp>
+        <p:nvSpPr>
+          <p:cNvPr id="7" name="Rectangle 6">
+            <a:extLst>
+              <a:ext uri="{FF2B5EF4-FFF2-40B4-BE49-F238E27FC236}">
+                <a16:creationId xmlns:a16="http://schemas.microsoft.com/office/drawing/2014/main" id="{C0E0D727-5350-9C43-AD33-5B96AB07CD08}"/>
+              </a:ext>
+            </a:extLst>
+          </p:cNvPr>
+          <p:cNvSpPr/>
+          <p:nvPr/>
+        </p:nvSpPr>
+        <p:spPr bwMode="auto">
+          <a:xfrm>
+            <a:off x="6936827" y="4014951"/>
+            <a:ext cx="4788381" cy="2487833"/>
+          </a:xfrm>
+          <a:prstGeom prst="rect">
+            <a:avLst/>
+          </a:prstGeom>
+          <a:noFill/>
+          <a:ln w="9525" cap="flat" cmpd="sng" algn="ctr">
+            <a:solidFill>
+              <a:schemeClr val="accent1"/>
+            </a:solidFill>
+            <a:prstDash val="solid"/>
+            <a:round/>
+            <a:headEnd type="none" w="med" len="med"/>
+            <a:tailEnd type="none" w="med" len="med"/>
+          </a:ln>
+        </p:spPr>
+        <p:style>
+          <a:lnRef idx="0">
+            <a:scrgbClr r="0" g="0" b="0"/>
+          </a:lnRef>
+          <a:fillRef idx="0">
+            <a:scrgbClr r="0" g="0" b="0"/>
+          </a:fillRef>
+          <a:effectRef idx="0">
+            <a:scrgbClr r="0" g="0" b="0"/>
+          </a:effectRef>
+          <a:fontRef idx="minor">
+            <a:schemeClr val="accent1"/>
+          </a:fontRef>
+        </p:style>
+        <p:txBody>
+          <a:bodyPr rot="0" spcFirstLastPara="0" vertOverflow="overflow" horzOverflow="overflow" vert="horz" wrap="square" lIns="182880" tIns="146304" rIns="182880" bIns="146304" numCol="1" spcCol="0" rtlCol="0" fromWordArt="0" anchor="t" anchorCtr="0" forceAA="0" compatLnSpc="1">
+            <a:prstTxWarp prst="textNoShape">
+              <a:avLst/>
+            </a:prstTxWarp>
+            <a:noAutofit/>
+          </a:bodyPr>
+          <a:lstStyle/>
+          <a:p>
+            <a:pPr algn="l" defTabSz="932472" fontAlgn="base">
+              <a:spcBef>
+                <a:spcPct val="0"/>
+              </a:spcBef>
+              <a:spcAft>
+                <a:spcPct val="0"/>
+              </a:spcAft>
+            </a:pPr>
+            <a:endParaRPr lang="en-US" sz="2000" dirty="0" err="1">
+              <a:solidFill>
+                <a:srgbClr val="FFFFFF"/>
+              </a:solidFill>
+              <a:ea typeface="Segoe UI" pitchFamily="34" charset="0"/>
+              <a:cs typeface="Segoe UI" pitchFamily="34" charset="0"/>
+            </a:endParaRPr>
+          </a:p>
+        </p:txBody>
+      </p:sp>
+      <p:sp>
+        <p:nvSpPr>
+          <p:cNvPr id="9" name="TextBox 8">
+            <a:extLst>
+              <a:ext uri="{FF2B5EF4-FFF2-40B4-BE49-F238E27FC236}">
+                <a16:creationId xmlns:a16="http://schemas.microsoft.com/office/drawing/2014/main" id="{683D2B51-37EE-6E4E-9037-1C91E527EFC9}"/>
+              </a:ext>
+            </a:extLst>
+          </p:cNvPr>
+          <p:cNvSpPr txBox="1"/>
+          <p:nvPr/>
+        </p:nvSpPr>
+        <p:spPr>
+          <a:xfrm>
+            <a:off x="7393945" y="4494086"/>
+            <a:ext cx="3904851" cy="1826617"/>
+          </a:xfrm>
+          <a:prstGeom prst="rect">
+            <a:avLst/>
+          </a:prstGeom>
+        </p:spPr>
+        <p:txBody>
+          <a:bodyPr vert="horz" wrap="square" lIns="0" tIns="0" rIns="0" bIns="0" rtlCol="0">
+            <a:normAutofit fontScale="77500" lnSpcReduction="20000"/>
+          </a:bodyPr>
+          <a:lstStyle/>
+          <a:p>
+            <a:pPr defTabSz="932742">
+              <a:spcAft>
+                <a:spcPts val="600"/>
+              </a:spcAft>
+              <a:buSzPct val="90000"/>
+            </a:pPr>
+            <a:r>
+              <a:rPr lang="en-US" sz="2800" dirty="0"/>
+              <a:t>Please tell us how you liked this workshop by filling out this survey:</a:t>
+            </a:r>
+            <a:br>
+              <a:rPr lang="en-US" sz="2800" dirty="0"/>
+            </a:br>
+            <a:endParaRPr lang="en-US" sz="2800" dirty="0"/>
+          </a:p>
+          <a:p>
+            <a:pPr defTabSz="932742">
+              <a:spcAft>
+                <a:spcPts val="600"/>
+              </a:spcAft>
+              <a:buSzPct val="90000"/>
+            </a:pPr>
+            <a:r>
+              <a:rPr lang="en-US" sz="2800" dirty="0">
+                <a:hlinkClick r:id="rId5"/>
+              </a:rPr>
+              <a:t>https://aka.ms/workshopomatic-feedback</a:t>
+            </a:r>
+            <a:endParaRPr lang="en-US" sz="2800" dirty="0"/>
+          </a:p>
+          <a:p>
+            <a:pPr defTabSz="932742">
+              <a:spcAft>
+                <a:spcPts val="600"/>
+              </a:spcAft>
+              <a:buSzPct val="90000"/>
+            </a:pPr>
+            <a:endParaRPr lang="en-US" sz="2800" dirty="0"/>
           </a:p>
         </p:txBody>
       </p:sp>

</xml_diff>